<commit_message>
Convert powerpoint files to xml
</commit_message>
<xml_diff>
--- a/signs/entrance.pptx
+++ b/signs/entrance.pptx
@@ -1,6 +1,6 @@
 
 <file path=ppt/presentation.xml><?xml version="1.0" encoding="utf-8"?>
-<p:presentation xmlns:a="http://schemas.openxmlformats.org/drawingml/2006/main" xmlns:r="http://schemas.openxmlformats.org/officeDocument/2006/relationships" xmlns:p="http://schemas.openxmlformats.org/presentationml/2006/main" saveSubsetFonts="1">
+<p:presentation xmlns:a="http://purl.oclc.org/ooxml/drawingml/main" xmlns:r="http://purl.oclc.org/ooxml/officeDocument/relationships" xmlns:p="http://purl.oclc.org/ooxml/presentationml/main" saveSubsetFonts="1" conformance="strict">
   <p:sldMasterIdLst>
     <p:sldMasterId id="2147483648" r:id="rId1"/>
   </p:sldMasterIdLst>
@@ -107,11 +107,16 @@
       </a:defRPr>
     </a:lvl9pPr>
   </p:defaultTextStyle>
+  <p:extLst>
+    <p:ext uri="{EFAFB233-063F-42B5-8137-9DF3F51BA10A}">
+      <p15:sldGuideLst xmlns:p15="http://schemas.microsoft.com/office/powerpoint/2012/main"/>
+    </p:ext>
+  </p:extLst>
 </p:presentation>
 </file>
 
 <file path=ppt/notesMasters/notesMaster1.xml><?xml version="1.0" encoding="utf-8"?>
-<p:notesMaster xmlns:a="http://schemas.openxmlformats.org/drawingml/2006/main" xmlns:r="http://schemas.openxmlformats.org/officeDocument/2006/relationships" xmlns:p="http://schemas.openxmlformats.org/presentationml/2006/main">
+<p:notesMaster xmlns:a="http://purl.oclc.org/ooxml/drawingml/main" xmlns:r="http://purl.oclc.org/ooxml/officeDocument/relationships" xmlns:p="http://purl.oclc.org/ooxml/presentationml/main">
   <p:cSld>
     <p:bg>
       <p:bgRef idx="1001">
@@ -461,7 +466,7 @@
 </file>
 
 <file path=ppt/slideLayouts/slideLayout1.xml><?xml version="1.0" encoding="utf-8"?>
-<p:sldLayout xmlns:a="http://schemas.openxmlformats.org/drawingml/2006/main" xmlns:r="http://schemas.openxmlformats.org/officeDocument/2006/relationships" xmlns:p="http://schemas.openxmlformats.org/presentationml/2006/main" type="title" preserve="1">
+<p:sldLayout xmlns:a="http://purl.oclc.org/ooxml/drawingml/main" xmlns:r="http://purl.oclc.org/ooxml/officeDocument/relationships" xmlns:p="http://purl.oclc.org/ooxml/presentationml/main" type="title" preserve="1">
   <p:cSld name="Title Slide">
     <p:spTree>
       <p:nvGrpSpPr>
@@ -683,7 +688,7 @@
 </file>
 
 <file path=ppt/slideLayouts/slideLayout10.xml><?xml version="1.0" encoding="utf-8"?>
-<p:sldLayout xmlns:a="http://schemas.openxmlformats.org/drawingml/2006/main" xmlns:r="http://schemas.openxmlformats.org/officeDocument/2006/relationships" xmlns:p="http://schemas.openxmlformats.org/presentationml/2006/main" type="vertTx" preserve="1">
+<p:sldLayout xmlns:a="http://purl.oclc.org/ooxml/drawingml/main" xmlns:r="http://purl.oclc.org/ooxml/officeDocument/relationships" xmlns:p="http://purl.oclc.org/ooxml/presentationml/main" type="vertTx" preserve="1">
   <p:cSld name="Title and Vertical Text">
     <p:spTree>
       <p:nvGrpSpPr>
@@ -883,7 +888,7 @@
 </file>
 
 <file path=ppt/slideLayouts/slideLayout11.xml><?xml version="1.0" encoding="utf-8"?>
-<p:sldLayout xmlns:a="http://schemas.openxmlformats.org/drawingml/2006/main" xmlns:r="http://schemas.openxmlformats.org/officeDocument/2006/relationships" xmlns:p="http://schemas.openxmlformats.org/presentationml/2006/main" type="vertTitleAndTx" preserve="1">
+<p:sldLayout xmlns:a="http://purl.oclc.org/ooxml/drawingml/main" xmlns:r="http://purl.oclc.org/ooxml/officeDocument/relationships" xmlns:p="http://purl.oclc.org/ooxml/presentationml/main" type="vertTitleAndTx" preserve="1">
   <p:cSld name="Vertical Title and Text">
     <p:spTree>
       <p:nvGrpSpPr>
@@ -1093,7 +1098,7 @@
 </file>
 
 <file path=ppt/slideLayouts/slideLayout2.xml><?xml version="1.0" encoding="utf-8"?>
-<p:sldLayout xmlns:a="http://schemas.openxmlformats.org/drawingml/2006/main" xmlns:r="http://schemas.openxmlformats.org/officeDocument/2006/relationships" xmlns:p="http://schemas.openxmlformats.org/presentationml/2006/main" type="obj" preserve="1">
+<p:sldLayout xmlns:a="http://purl.oclc.org/ooxml/drawingml/main" xmlns:r="http://purl.oclc.org/ooxml/officeDocument/relationships" xmlns:p="http://purl.oclc.org/ooxml/presentationml/main" type="obj" preserve="1">
   <p:cSld name="Title and Content">
     <p:spTree>
       <p:nvGrpSpPr>
@@ -1293,7 +1298,7 @@
 </file>
 
 <file path=ppt/slideLayouts/slideLayout3.xml><?xml version="1.0" encoding="utf-8"?>
-<p:sldLayout xmlns:a="http://schemas.openxmlformats.org/drawingml/2006/main" xmlns:r="http://schemas.openxmlformats.org/officeDocument/2006/relationships" xmlns:p="http://schemas.openxmlformats.org/presentationml/2006/main" type="secHead" preserve="1">
+<p:sldLayout xmlns:a="http://purl.oclc.org/ooxml/drawingml/main" xmlns:r="http://purl.oclc.org/ooxml/officeDocument/relationships" xmlns:p="http://purl.oclc.org/ooxml/presentationml/main" type="secHead" preserve="1">
   <p:cSld name="Section Header">
     <p:spTree>
       <p:nvGrpSpPr>
@@ -1377,7 +1382,7 @@
               <a:defRPr sz="4209">
                 <a:solidFill>
                   <a:schemeClr val="tx1">
-                    <a:tint val="75000"/>
+                    <a:tint val="75%"/>
                   </a:schemeClr>
                 </a:solidFill>
               </a:defRPr>
@@ -1387,7 +1392,7 @@
               <a:defRPr sz="3508">
                 <a:solidFill>
                   <a:schemeClr val="tx1">
-                    <a:tint val="75000"/>
+                    <a:tint val="75%"/>
                   </a:schemeClr>
                 </a:solidFill>
               </a:defRPr>
@@ -1397,7 +1402,7 @@
               <a:defRPr sz="3157">
                 <a:solidFill>
                   <a:schemeClr val="tx1">
-                    <a:tint val="75000"/>
+                    <a:tint val="75%"/>
                   </a:schemeClr>
                 </a:solidFill>
               </a:defRPr>
@@ -1407,7 +1412,7 @@
               <a:defRPr sz="2806">
                 <a:solidFill>
                   <a:schemeClr val="tx1">
-                    <a:tint val="75000"/>
+                    <a:tint val="75%"/>
                   </a:schemeClr>
                 </a:solidFill>
               </a:defRPr>
@@ -1417,7 +1422,7 @@
               <a:defRPr sz="2806">
                 <a:solidFill>
                   <a:schemeClr val="tx1">
-                    <a:tint val="75000"/>
+                    <a:tint val="75%"/>
                   </a:schemeClr>
                 </a:solidFill>
               </a:defRPr>
@@ -1427,7 +1432,7 @@
               <a:defRPr sz="2806">
                 <a:solidFill>
                   <a:schemeClr val="tx1">
-                    <a:tint val="75000"/>
+                    <a:tint val="75%"/>
                   </a:schemeClr>
                 </a:solidFill>
               </a:defRPr>
@@ -1437,7 +1442,7 @@
               <a:defRPr sz="2806">
                 <a:solidFill>
                   <a:schemeClr val="tx1">
-                    <a:tint val="75000"/>
+                    <a:tint val="75%"/>
                   </a:schemeClr>
                 </a:solidFill>
               </a:defRPr>
@@ -1447,7 +1452,7 @@
               <a:defRPr sz="2806">
                 <a:solidFill>
                   <a:schemeClr val="tx1">
-                    <a:tint val="75000"/>
+                    <a:tint val="75%"/>
                   </a:schemeClr>
                 </a:solidFill>
               </a:defRPr>
@@ -1457,7 +1462,7 @@
               <a:defRPr sz="2806">
                 <a:solidFill>
                   <a:schemeClr val="tx1">
-                    <a:tint val="75000"/>
+                    <a:tint val="75%"/>
                   </a:schemeClr>
                 </a:solidFill>
               </a:defRPr>
@@ -1569,7 +1574,7 @@
 </file>
 
 <file path=ppt/slideLayouts/slideLayout4.xml><?xml version="1.0" encoding="utf-8"?>
-<p:sldLayout xmlns:a="http://schemas.openxmlformats.org/drawingml/2006/main" xmlns:r="http://schemas.openxmlformats.org/officeDocument/2006/relationships" xmlns:p="http://schemas.openxmlformats.org/presentationml/2006/main" type="twoObj" preserve="1">
+<p:sldLayout xmlns:a="http://purl.oclc.org/ooxml/drawingml/main" xmlns:r="http://purl.oclc.org/ooxml/officeDocument/relationships" xmlns:p="http://purl.oclc.org/ooxml/presentationml/main" type="twoObj" preserve="1">
   <p:cSld name="Two Content">
     <p:spTree>
       <p:nvGrpSpPr>
@@ -1837,7 +1842,7 @@
 </file>
 
 <file path=ppt/slideLayouts/slideLayout5.xml><?xml version="1.0" encoding="utf-8"?>
-<p:sldLayout xmlns:a="http://schemas.openxmlformats.org/drawingml/2006/main" xmlns:r="http://schemas.openxmlformats.org/officeDocument/2006/relationships" xmlns:p="http://schemas.openxmlformats.org/presentationml/2006/main" type="twoTxTwoObj" preserve="1">
+<p:sldLayout xmlns:a="http://purl.oclc.org/ooxml/drawingml/main" xmlns:r="http://purl.oclc.org/ooxml/officeDocument/relationships" xmlns:p="http://purl.oclc.org/ooxml/presentationml/main" type="twoTxTwoObj" preserve="1">
   <p:cSld name="Comparison">
     <p:spTree>
       <p:nvGrpSpPr>
@@ -2252,7 +2257,7 @@
 </file>
 
 <file path=ppt/slideLayouts/slideLayout6.xml><?xml version="1.0" encoding="utf-8"?>
-<p:sldLayout xmlns:a="http://schemas.openxmlformats.org/drawingml/2006/main" xmlns:r="http://schemas.openxmlformats.org/officeDocument/2006/relationships" xmlns:p="http://schemas.openxmlformats.org/presentationml/2006/main" type="titleOnly" preserve="1">
+<p:sldLayout xmlns:a="http://purl.oclc.org/ooxml/drawingml/main" xmlns:r="http://purl.oclc.org/ooxml/officeDocument/relationships" xmlns:p="http://purl.oclc.org/ooxml/presentationml/main" type="titleOnly" preserve="1">
   <p:cSld name="Title Only">
     <p:spTree>
       <p:nvGrpSpPr>
@@ -2394,7 +2399,7 @@
 </file>
 
 <file path=ppt/slideLayouts/slideLayout7.xml><?xml version="1.0" encoding="utf-8"?>
-<p:sldLayout xmlns:a="http://schemas.openxmlformats.org/drawingml/2006/main" xmlns:r="http://schemas.openxmlformats.org/officeDocument/2006/relationships" xmlns:p="http://schemas.openxmlformats.org/presentationml/2006/main" type="blank" preserve="1">
+<p:sldLayout xmlns:a="http://purl.oclc.org/ooxml/drawingml/main" xmlns:r="http://purl.oclc.org/ooxml/officeDocument/relationships" xmlns:p="http://purl.oclc.org/ooxml/presentationml/main" type="blank" preserve="1">
   <p:cSld name="Blank">
     <p:spTree>
       <p:nvGrpSpPr>
@@ -2507,7 +2512,7 @@
 </file>
 
 <file path=ppt/slideLayouts/slideLayout8.xml><?xml version="1.0" encoding="utf-8"?>
-<p:sldLayout xmlns:a="http://schemas.openxmlformats.org/drawingml/2006/main" xmlns:r="http://schemas.openxmlformats.org/officeDocument/2006/relationships" xmlns:p="http://schemas.openxmlformats.org/presentationml/2006/main" type="objTx" preserve="1">
+<p:sldLayout xmlns:a="http://purl.oclc.org/ooxml/drawingml/main" xmlns:r="http://purl.oclc.org/ooxml/officeDocument/relationships" xmlns:p="http://purl.oclc.org/ooxml/presentationml/main" type="objTx" preserve="1">
   <p:cSld name="Content with Caption">
     <p:spTree>
       <p:nvGrpSpPr>
@@ -2820,7 +2825,7 @@
 </file>
 
 <file path=ppt/slideLayouts/slideLayout9.xml><?xml version="1.0" encoding="utf-8"?>
-<p:sldLayout xmlns:a="http://schemas.openxmlformats.org/drawingml/2006/main" xmlns:r="http://schemas.openxmlformats.org/officeDocument/2006/relationships" xmlns:p="http://schemas.openxmlformats.org/presentationml/2006/main" type="picTx" preserve="1">
+<p:sldLayout xmlns:a="http://purl.oclc.org/ooxml/drawingml/main" xmlns:r="http://purl.oclc.org/ooxml/officeDocument/relationships" xmlns:p="http://purl.oclc.org/ooxml/presentationml/main" type="picTx" preserve="1">
   <p:cSld name="Picture with Caption">
     <p:spTree>
       <p:nvGrpSpPr>
@@ -3109,7 +3114,7 @@
 </file>
 
 <file path=ppt/slideMasters/slideMaster1.xml><?xml version="1.0" encoding="utf-8"?>
-<p:sldMaster xmlns:a="http://schemas.openxmlformats.org/drawingml/2006/main" xmlns:r="http://schemas.openxmlformats.org/officeDocument/2006/relationships" xmlns:p="http://schemas.openxmlformats.org/presentationml/2006/main">
+<p:sldMaster xmlns:a="http://purl.oclc.org/ooxml/drawingml/main" xmlns:r="http://purl.oclc.org/ooxml/officeDocument/relationships" xmlns:p="http://purl.oclc.org/ooxml/presentationml/main">
   <p:cSld>
     <p:bg>
       <p:bgRef idx="1001">
@@ -3269,7 +3274,7 @@
               <a:defRPr sz="2105">
                 <a:solidFill>
                   <a:schemeClr val="tx1">
-                    <a:tint val="75000"/>
+                    <a:tint val="75%"/>
                   </a:schemeClr>
                 </a:solidFill>
               </a:defRPr>
@@ -3316,7 +3321,7 @@
               <a:defRPr sz="2105">
                 <a:solidFill>
                   <a:schemeClr val="tx1">
-                    <a:tint val="75000"/>
+                    <a:tint val="75%"/>
                   </a:schemeClr>
                 </a:solidFill>
               </a:defRPr>
@@ -3359,7 +3364,7 @@
               <a:defRPr sz="2105">
                 <a:solidFill>
                   <a:schemeClr val="tx1">
-                    <a:tint val="75000"/>
+                    <a:tint val="75%"/>
                   </a:schemeClr>
                 </a:solidFill>
               </a:defRPr>
@@ -3399,10 +3404,10 @@
     <p:titleStyle>
       <a:lvl1pPr algn="l" defTabSz="1603766" rtl="0" eaLnBrk="1" latinLnBrk="0" hangingPunct="1">
         <a:lnSpc>
-          <a:spcPct val="90000"/>
+          <a:spcPct val="90%"/>
         </a:lnSpc>
         <a:spcBef>
-          <a:spcPct val="0"/>
+          <a:spcPct val="0%"/>
         </a:spcBef>
         <a:buNone/>
         <a:defRPr sz="7717" kern="1200">
@@ -3418,7 +3423,7 @@
     <p:bodyStyle>
       <a:lvl1pPr marL="400942" indent="-400942" algn="l" defTabSz="1603766" rtl="0" eaLnBrk="1" latinLnBrk="0" hangingPunct="1">
         <a:lnSpc>
-          <a:spcPct val="90000"/>
+          <a:spcPct val="90%"/>
         </a:lnSpc>
         <a:spcBef>
           <a:spcPts val="1754"/>
@@ -3436,7 +3441,7 @@
       </a:lvl1pPr>
       <a:lvl2pPr marL="1202825" indent="-400942" algn="l" defTabSz="1603766" rtl="0" eaLnBrk="1" latinLnBrk="0" hangingPunct="1">
         <a:lnSpc>
-          <a:spcPct val="90000"/>
+          <a:spcPct val="90%"/>
         </a:lnSpc>
         <a:spcBef>
           <a:spcPts val="877"/>
@@ -3454,7 +3459,7 @@
       </a:lvl2pPr>
       <a:lvl3pPr marL="2004708" indent="-400942" algn="l" defTabSz="1603766" rtl="0" eaLnBrk="1" latinLnBrk="0" hangingPunct="1">
         <a:lnSpc>
-          <a:spcPct val="90000"/>
+          <a:spcPct val="90%"/>
         </a:lnSpc>
         <a:spcBef>
           <a:spcPts val="877"/>
@@ -3472,7 +3477,7 @@
       </a:lvl3pPr>
       <a:lvl4pPr marL="2806591" indent="-400942" algn="l" defTabSz="1603766" rtl="0" eaLnBrk="1" latinLnBrk="0" hangingPunct="1">
         <a:lnSpc>
-          <a:spcPct val="90000"/>
+          <a:spcPct val="90%"/>
         </a:lnSpc>
         <a:spcBef>
           <a:spcPts val="877"/>
@@ -3490,7 +3495,7 @@
       </a:lvl4pPr>
       <a:lvl5pPr marL="3608474" indent="-400942" algn="l" defTabSz="1603766" rtl="0" eaLnBrk="1" latinLnBrk="0" hangingPunct="1">
         <a:lnSpc>
-          <a:spcPct val="90000"/>
+          <a:spcPct val="90%"/>
         </a:lnSpc>
         <a:spcBef>
           <a:spcPts val="877"/>
@@ -3508,7 +3513,7 @@
       </a:lvl5pPr>
       <a:lvl6pPr marL="4410357" indent="-400942" algn="l" defTabSz="1603766" rtl="0" eaLnBrk="1" latinLnBrk="0" hangingPunct="1">
         <a:lnSpc>
-          <a:spcPct val="90000"/>
+          <a:spcPct val="90%"/>
         </a:lnSpc>
         <a:spcBef>
           <a:spcPts val="877"/>
@@ -3526,7 +3531,7 @@
       </a:lvl6pPr>
       <a:lvl7pPr marL="5212240" indent="-400942" algn="l" defTabSz="1603766" rtl="0" eaLnBrk="1" latinLnBrk="0" hangingPunct="1">
         <a:lnSpc>
-          <a:spcPct val="90000"/>
+          <a:spcPct val="90%"/>
         </a:lnSpc>
         <a:spcBef>
           <a:spcPts val="877"/>
@@ -3544,7 +3549,7 @@
       </a:lvl7pPr>
       <a:lvl8pPr marL="6014123" indent="-400942" algn="l" defTabSz="1603766" rtl="0" eaLnBrk="1" latinLnBrk="0" hangingPunct="1">
         <a:lnSpc>
-          <a:spcPct val="90000"/>
+          <a:spcPct val="90%"/>
         </a:lnSpc>
         <a:spcBef>
           <a:spcPts val="877"/>
@@ -3562,7 +3567,7 @@
       </a:lvl8pPr>
       <a:lvl9pPr marL="6816006" indent="-400942" algn="l" defTabSz="1603766" rtl="0" eaLnBrk="1" latinLnBrk="0" hangingPunct="1">
         <a:lnSpc>
-          <a:spcPct val="90000"/>
+          <a:spcPct val="90%"/>
         </a:lnSpc>
         <a:spcBef>
           <a:spcPts val="877"/>
@@ -3679,7 +3684,7 @@
 </file>
 
 <file path=ppt/slides/slide1.xml><?xml version="1.0" encoding="utf-8"?>
-<p:sld xmlns:a="http://schemas.openxmlformats.org/drawingml/2006/main" xmlns:r="http://schemas.openxmlformats.org/officeDocument/2006/relationships" xmlns:p="http://schemas.openxmlformats.org/presentationml/2006/main">
+<p:sld xmlns:a="http://purl.oclc.org/ooxml/drawingml/main" xmlns:r="http://purl.oclc.org/ooxml/officeDocument/relationships" xmlns:p="http://purl.oclc.org/ooxml/presentationml/main">
   <p:cSld>
     <p:spTree>
       <p:nvGrpSpPr>
@@ -3748,7 +3753,7 @@
                 <a:solidFill>
                   <a:srgbClr val="000000"/>
                 </a:solidFill>
-                <a:miter lim="800000"/>
+                <a:miter lim="800%"/>
                 <a:headEnd/>
                 <a:tailEnd/>
               </a14:hiddenLine>
@@ -3805,7 +3810,7 @@
                 <a:solidFill>
                   <a:srgbClr val="000000"/>
                 </a:solidFill>
-                <a:miter lim="800000"/>
+                <a:miter lim="800%"/>
                 <a:headEnd/>
                 <a:tailEnd/>
               </a14:hiddenLine>
@@ -3831,13 +3836,13 @@
           <a:p>
             <a:pPr marL="0" marR="0" lvl="0" indent="0" algn="ctr" defTabSz="914400" rtl="0" eaLnBrk="0" fontAlgn="base" latinLnBrk="0" hangingPunct="0">
               <a:lnSpc>
-                <a:spcPct val="100000"/>
+                <a:spcPct val="100%"/>
               </a:lnSpc>
               <a:spcBef>
-                <a:spcPct val="0"/>
+                <a:spcPct val="0%"/>
               </a:spcBef>
               <a:spcAft>
-                <a:spcPct val="0"/>
+                <a:spcPct val="0%"/>
               </a:spcAft>
               <a:buClrTx/>
               <a:buSzTx/>
@@ -3846,7 +3851,7 @@
               <a:tabLst/>
             </a:pPr>
             <a:r>
-              <a:rPr kumimoji="0" lang="en-GB" altLang="en-US" sz="28000" b="0" i="0" u="none" strike="noStrike" cap="none" normalizeH="0" baseline="0">
+              <a:rPr kumimoji="0" lang="en-GB" altLang="en-US" sz="28000" b="0" i="0" u="none" strike="noStrike" cap="none" normalizeH="0" baseline="0%">
                 <a:ln>
                   <a:noFill/>
                 </a:ln>
@@ -3858,7 +3863,7 @@
               </a:rPr>
               <a:t>ENTRANCE</a:t>
             </a:r>
-            <a:endParaRPr kumimoji="0" lang="en-US" altLang="en-US" sz="1800" b="0" i="0" u="none" strike="noStrike" cap="none" normalizeH="0" baseline="0">
+            <a:endParaRPr kumimoji="0" lang="en-US" altLang="en-US" sz="1800" b="0" i="0" u="none" strike="noStrike" cap="none" normalizeH="0" baseline="0%">
               <a:ln>
                 <a:noFill/>
               </a:ln>
@@ -3911,7 +3916,7 @@
                 <a:solidFill>
                   <a:srgbClr val="000000"/>
                 </a:solidFill>
-                <a:miter lim="800000"/>
+                <a:miter lim="800%"/>
                 <a:headEnd/>
                 <a:tailEnd/>
               </a14:hiddenLine>
@@ -3937,13 +3942,13 @@
           <a:p>
             <a:pPr marL="0" marR="0" lvl="0" indent="0" algn="ctr" defTabSz="914400" rtl="0" eaLnBrk="0" fontAlgn="base" latinLnBrk="0" hangingPunct="0">
               <a:lnSpc>
-                <a:spcPct val="100000"/>
+                <a:spcPct val="100%"/>
               </a:lnSpc>
               <a:spcBef>
-                <a:spcPct val="0"/>
+                <a:spcPct val="0%"/>
               </a:spcBef>
               <a:spcAft>
-                <a:spcPct val="0"/>
+                <a:spcPct val="0%"/>
               </a:spcAft>
               <a:buClrTx/>
               <a:buSzTx/>
@@ -3952,7 +3957,7 @@
               <a:tabLst/>
             </a:pPr>
             <a:r>
-              <a:rPr kumimoji="0" lang="en-GB" altLang="en-US" sz="13000" b="1" i="0" u="none" strike="noStrike" cap="none" normalizeH="0" baseline="0">
+              <a:rPr kumimoji="0" lang="en-GB" altLang="en-US" sz="13000" b="1" i="0" u="none" strike="noStrike" cap="none" normalizeH="0" baseline="0%">
                 <a:ln>
                   <a:noFill/>
                 </a:ln>
@@ -3964,7 +3969,7 @@
               </a:rPr>
               <a:t>STUDENT ROBOTICS</a:t>
             </a:r>
-            <a:endParaRPr kumimoji="0" lang="en-US" altLang="en-US" sz="1800" b="0" i="0" u="none" strike="noStrike" cap="none" normalizeH="0" baseline="0">
+            <a:endParaRPr kumimoji="0" lang="en-US" altLang="en-US" sz="1800" b="0" i="0" u="none" strike="noStrike" cap="none" normalizeH="0" baseline="0%">
               <a:ln>
                 <a:noFill/>
               </a:ln>
@@ -3991,7 +3996,7 @@
 </file>
 
 <file path=ppt/theme/theme1.xml><?xml version="1.0" encoding="utf-8"?>
-<a:theme xmlns:a="http://schemas.openxmlformats.org/drawingml/2006/main" name="Office Theme">
+<a:theme xmlns:a="http://purl.oclc.org/ooxml/drawingml/main" name="Office Theme">
   <a:themeElements>
     <a:clrScheme name="Office">
       <a:dk1>
@@ -4144,25 +4149,25 @@
         </a:solidFill>
         <a:gradFill rotWithShape="1">
           <a:gsLst>
-            <a:gs pos="0">
+            <a:gs pos="0%">
               <a:schemeClr val="phClr">
-                <a:lumMod val="110000"/>
-                <a:satMod val="105000"/>
-                <a:tint val="67000"/>
+                <a:lumMod val="110%"/>
+                <a:satMod val="105%"/>
+                <a:tint val="67%"/>
               </a:schemeClr>
             </a:gs>
-            <a:gs pos="50000">
+            <a:gs pos="50%">
               <a:schemeClr val="phClr">
-                <a:lumMod val="105000"/>
-                <a:satMod val="103000"/>
-                <a:tint val="73000"/>
+                <a:lumMod val="105%"/>
+                <a:satMod val="103%"/>
+                <a:tint val="73%"/>
               </a:schemeClr>
             </a:gs>
-            <a:gs pos="100000">
+            <a:gs pos="100%">
               <a:schemeClr val="phClr">
-                <a:lumMod val="105000"/>
-                <a:satMod val="109000"/>
-                <a:tint val="81000"/>
+                <a:lumMod val="105%"/>
+                <a:satMod val="109%"/>
+                <a:tint val="81%"/>
               </a:schemeClr>
             </a:gs>
           </a:gsLst>
@@ -4170,25 +4175,25 @@
         </a:gradFill>
         <a:gradFill rotWithShape="1">
           <a:gsLst>
-            <a:gs pos="0">
+            <a:gs pos="0%">
               <a:schemeClr val="phClr">
-                <a:satMod val="103000"/>
-                <a:lumMod val="102000"/>
-                <a:tint val="94000"/>
+                <a:satMod val="103%"/>
+                <a:lumMod val="102%"/>
+                <a:tint val="94%"/>
               </a:schemeClr>
             </a:gs>
-            <a:gs pos="50000">
+            <a:gs pos="50%">
               <a:schemeClr val="phClr">
-                <a:satMod val="110000"/>
-                <a:lumMod val="100000"/>
-                <a:shade val="100000"/>
+                <a:satMod val="110%"/>
+                <a:lumMod val="100%"/>
+                <a:shade val="100%"/>
               </a:schemeClr>
             </a:gs>
-            <a:gs pos="100000">
+            <a:gs pos="100%">
               <a:schemeClr val="phClr">
-                <a:lumMod val="99000"/>
-                <a:satMod val="120000"/>
-                <a:shade val="78000"/>
+                <a:lumMod val="99%"/>
+                <a:satMod val="120%"/>
+                <a:shade val="78%"/>
               </a:schemeClr>
             </a:gs>
           </a:gsLst>
@@ -4201,21 +4206,21 @@
             <a:schemeClr val="phClr"/>
           </a:solidFill>
           <a:prstDash val="solid"/>
-          <a:miter lim="800000"/>
+          <a:miter lim="800%"/>
         </a:ln>
         <a:ln w="12700" cap="flat" cmpd="sng" algn="ctr">
           <a:solidFill>
             <a:schemeClr val="phClr"/>
           </a:solidFill>
           <a:prstDash val="solid"/>
-          <a:miter lim="800000"/>
+          <a:miter lim="800%"/>
         </a:ln>
         <a:ln w="19050" cap="flat" cmpd="sng" algn="ctr">
           <a:solidFill>
             <a:schemeClr val="phClr"/>
           </a:solidFill>
           <a:prstDash val="solid"/>
-          <a:miter lim="800000"/>
+          <a:miter lim="800%"/>
         </a:ln>
       </a:lnStyleLst>
       <a:effectStyleLst>
@@ -4229,7 +4234,7 @@
           <a:effectLst>
             <a:outerShdw blurRad="57150" dist="19050" dir="5400000" algn="ctr" rotWithShape="0">
               <a:srgbClr val="000000">
-                <a:alpha val="63000"/>
+                <a:alpha val="63%"/>
               </a:srgbClr>
             </a:outerShdw>
           </a:effectLst>
@@ -4241,32 +4246,32 @@
         </a:solidFill>
         <a:solidFill>
           <a:schemeClr val="phClr">
-            <a:tint val="95000"/>
-            <a:satMod val="170000"/>
+            <a:tint val="95%"/>
+            <a:satMod val="170%"/>
           </a:schemeClr>
         </a:solidFill>
         <a:gradFill rotWithShape="1">
           <a:gsLst>
-            <a:gs pos="0">
+            <a:gs pos="0%">
               <a:schemeClr val="phClr">
-                <a:tint val="93000"/>
-                <a:satMod val="150000"/>
-                <a:shade val="98000"/>
-                <a:lumMod val="102000"/>
+                <a:tint val="93%"/>
+                <a:satMod val="150%"/>
+                <a:shade val="98%"/>
+                <a:lumMod val="102%"/>
               </a:schemeClr>
             </a:gs>
-            <a:gs pos="50000">
+            <a:gs pos="50%">
               <a:schemeClr val="phClr">
-                <a:tint val="98000"/>
-                <a:satMod val="130000"/>
-                <a:shade val="90000"/>
-                <a:lumMod val="103000"/>
+                <a:tint val="98%"/>
+                <a:satMod val="130%"/>
+                <a:shade val="90%"/>
+                <a:lumMod val="103%"/>
               </a:schemeClr>
             </a:gs>
-            <a:gs pos="100000">
+            <a:gs pos="100%">
               <a:schemeClr val="phClr">
-                <a:shade val="63000"/>
-                <a:satMod val="120000"/>
+                <a:shade val="63%"/>
+                <a:satMod val="120%"/>
               </a:schemeClr>
             </a:gs>
           </a:gsLst>
@@ -4286,7 +4291,7 @@
 </file>
 
 <file path=ppt/theme/theme2.xml><?xml version="1.0" encoding="utf-8"?>
-<a:theme xmlns:a="http://schemas.openxmlformats.org/drawingml/2006/main" name="Office Theme">
+<a:theme xmlns:a="http://purl.oclc.org/ooxml/drawingml/main" name="Office Theme">
   <a:themeElements>
     <a:clrScheme name="Office">
       <a:dk1>
@@ -4439,25 +4444,25 @@
         </a:solidFill>
         <a:gradFill rotWithShape="1">
           <a:gsLst>
-            <a:gs pos="0">
+            <a:gs pos="0%">
               <a:schemeClr val="phClr">
-                <a:lumMod val="110000"/>
-                <a:satMod val="105000"/>
-                <a:tint val="67000"/>
+                <a:lumMod val="110%"/>
+                <a:satMod val="105%"/>
+                <a:tint val="67%"/>
               </a:schemeClr>
             </a:gs>
-            <a:gs pos="50000">
+            <a:gs pos="50%">
               <a:schemeClr val="phClr">
-                <a:lumMod val="105000"/>
-                <a:satMod val="103000"/>
-                <a:tint val="73000"/>
+                <a:lumMod val="105%"/>
+                <a:satMod val="103%"/>
+                <a:tint val="73%"/>
               </a:schemeClr>
             </a:gs>
-            <a:gs pos="100000">
+            <a:gs pos="100%">
               <a:schemeClr val="phClr">
-                <a:lumMod val="105000"/>
-                <a:satMod val="109000"/>
-                <a:tint val="81000"/>
+                <a:lumMod val="105%"/>
+                <a:satMod val="109%"/>
+                <a:tint val="81%"/>
               </a:schemeClr>
             </a:gs>
           </a:gsLst>
@@ -4465,25 +4470,25 @@
         </a:gradFill>
         <a:gradFill rotWithShape="1">
           <a:gsLst>
-            <a:gs pos="0">
+            <a:gs pos="0%">
               <a:schemeClr val="phClr">
-                <a:satMod val="103000"/>
-                <a:lumMod val="102000"/>
-                <a:tint val="94000"/>
+                <a:satMod val="103%"/>
+                <a:lumMod val="102%"/>
+                <a:tint val="94%"/>
               </a:schemeClr>
             </a:gs>
-            <a:gs pos="50000">
+            <a:gs pos="50%">
               <a:schemeClr val="phClr">
-                <a:satMod val="110000"/>
-                <a:lumMod val="100000"/>
-                <a:shade val="100000"/>
+                <a:satMod val="110%"/>
+                <a:lumMod val="100%"/>
+                <a:shade val="100%"/>
               </a:schemeClr>
             </a:gs>
-            <a:gs pos="100000">
+            <a:gs pos="100%">
               <a:schemeClr val="phClr">
-                <a:lumMod val="99000"/>
-                <a:satMod val="120000"/>
-                <a:shade val="78000"/>
+                <a:lumMod val="99%"/>
+                <a:satMod val="120%"/>
+                <a:shade val="78%"/>
               </a:schemeClr>
             </a:gs>
           </a:gsLst>
@@ -4496,21 +4501,21 @@
             <a:schemeClr val="phClr"/>
           </a:solidFill>
           <a:prstDash val="solid"/>
-          <a:miter lim="800000"/>
+          <a:miter lim="800%"/>
         </a:ln>
         <a:ln w="12700" cap="flat" cmpd="sng" algn="ctr">
           <a:solidFill>
             <a:schemeClr val="phClr"/>
           </a:solidFill>
           <a:prstDash val="solid"/>
-          <a:miter lim="800000"/>
+          <a:miter lim="800%"/>
         </a:ln>
         <a:ln w="19050" cap="flat" cmpd="sng" algn="ctr">
           <a:solidFill>
             <a:schemeClr val="phClr"/>
           </a:solidFill>
           <a:prstDash val="solid"/>
-          <a:miter lim="800000"/>
+          <a:miter lim="800%"/>
         </a:ln>
       </a:lnStyleLst>
       <a:effectStyleLst>
@@ -4524,7 +4529,7 @@
           <a:effectLst>
             <a:outerShdw blurRad="57150" dist="19050" dir="5400000" algn="ctr" rotWithShape="0">
               <a:srgbClr val="000000">
-                <a:alpha val="63000"/>
+                <a:alpha val="63%"/>
               </a:srgbClr>
             </a:outerShdw>
           </a:effectLst>
@@ -4536,32 +4541,32 @@
         </a:solidFill>
         <a:solidFill>
           <a:schemeClr val="phClr">
-            <a:tint val="95000"/>
-            <a:satMod val="170000"/>
+            <a:tint val="95%"/>
+            <a:satMod val="170%"/>
           </a:schemeClr>
         </a:solidFill>
         <a:gradFill rotWithShape="1">
           <a:gsLst>
-            <a:gs pos="0">
+            <a:gs pos="0%">
               <a:schemeClr val="phClr">
-                <a:tint val="93000"/>
-                <a:satMod val="150000"/>
-                <a:shade val="98000"/>
-                <a:lumMod val="102000"/>
+                <a:tint val="93%"/>
+                <a:satMod val="150%"/>
+                <a:shade val="98%"/>
+                <a:lumMod val="102%"/>
               </a:schemeClr>
             </a:gs>
-            <a:gs pos="50000">
+            <a:gs pos="50%">
               <a:schemeClr val="phClr">
-                <a:tint val="98000"/>
-                <a:satMod val="130000"/>
-                <a:shade val="90000"/>
-                <a:lumMod val="103000"/>
+                <a:tint val="98%"/>
+                <a:satMod val="130%"/>
+                <a:shade val="90%"/>
+                <a:lumMod val="103%"/>
               </a:schemeClr>
             </a:gs>
-            <a:gs pos="100000">
+            <a:gs pos="100%">
               <a:schemeClr val="phClr">
-                <a:shade val="63000"/>
-                <a:satMod val="120000"/>
+                <a:shade val="63%"/>
+                <a:satMod val="120%"/>
               </a:schemeClr>
             </a:gs>
           </a:gsLst>

</xml_diff>